<commit_message>
powerpoint updated 3rd time
</commit_message>
<xml_diff>
--- a/arcadegame.pptx
+++ b/arcadegame.pptx
@@ -721,23 +721,26 @@
           </c:marker>
           <c:cat>
             <c:numRef>
-              <c:f>Blad1!$A$2:$A$6</c:f>
+              <c:f>Blad1!$A$2:$A$8</c:f>
               <c:numCache>
                 <c:formatCode>d\-mmm</c:formatCode>
-                <c:ptCount val="5"/>
+                <c:ptCount val="7"/>
                 <c:pt idx="0">
+                  <c:v>42694</c:v>
+                </c:pt>
+                <c:pt idx="1">
                   <c:v>42695</c:v>
                 </c:pt>
-                <c:pt idx="1">
+                <c:pt idx="2">
                   <c:v>42696</c:v>
                 </c:pt>
-                <c:pt idx="2">
+                <c:pt idx="3">
                   <c:v>42697</c:v>
                 </c:pt>
-                <c:pt idx="3">
+                <c:pt idx="4">
                   <c:v>42698</c:v>
                 </c:pt>
-                <c:pt idx="4">
+                <c:pt idx="5">
                   <c:v>42699</c:v>
                 </c:pt>
               </c:numCache>
@@ -745,23 +748,26 @@
           </c:cat>
           <c:val>
             <c:numRef>
-              <c:f>Blad1!$B$2:$B$6</c:f>
+              <c:f>Blad1!$B$2:$B$8</c:f>
               <c:numCache>
                 <c:formatCode>General</c:formatCode>
-                <c:ptCount val="5"/>
+                <c:ptCount val="7"/>
                 <c:pt idx="0">
-                  <c:v>192</c:v>
+                  <c:v>184</c:v>
                 </c:pt>
                 <c:pt idx="1">
-                  <c:v>166</c:v>
+                  <c:v>158</c:v>
                 </c:pt>
                 <c:pt idx="2">
-                  <c:v>148</c:v>
+                  <c:v>140</c:v>
                 </c:pt>
                 <c:pt idx="3">
-                  <c:v>82</c:v>
+                  <c:v>91</c:v>
                 </c:pt>
                 <c:pt idx="4">
+                  <c:v>44</c:v>
+                </c:pt>
+                <c:pt idx="5">
                   <c:v>0</c:v>
                 </c:pt>
               </c:numCache>
@@ -808,23 +814,26 @@
           </c:marker>
           <c:cat>
             <c:numRef>
-              <c:f>Blad1!$A$2:$A$6</c:f>
+              <c:f>Blad1!$A$2:$A$8</c:f>
               <c:numCache>
                 <c:formatCode>d\-mmm</c:formatCode>
-                <c:ptCount val="5"/>
+                <c:ptCount val="7"/>
                 <c:pt idx="0">
+                  <c:v>42694</c:v>
+                </c:pt>
+                <c:pt idx="1">
                   <c:v>42695</c:v>
                 </c:pt>
-                <c:pt idx="1">
+                <c:pt idx="2">
                   <c:v>42696</c:v>
                 </c:pt>
-                <c:pt idx="2">
+                <c:pt idx="3">
                   <c:v>42697</c:v>
                 </c:pt>
-                <c:pt idx="3">
+                <c:pt idx="4">
                   <c:v>42698</c:v>
                 </c:pt>
-                <c:pt idx="4">
+                <c:pt idx="5">
                   <c:v>42699</c:v>
                 </c:pt>
               </c:numCache>
@@ -832,24 +841,27 @@
           </c:cat>
           <c:val>
             <c:numRef>
-              <c:f>Blad1!$C$2:$C$6</c:f>
+              <c:f>Blad1!$C$2:$C$8</c:f>
               <c:numCache>
                 <c:formatCode>General</c:formatCode>
-                <c:ptCount val="5"/>
+                <c:ptCount val="7"/>
                 <c:pt idx="0">
-                  <c:v>192</c:v>
+                  <c:v>184</c:v>
                 </c:pt>
                 <c:pt idx="1">
-                  <c:v>154</c:v>
+                  <c:v>147</c:v>
                 </c:pt>
                 <c:pt idx="2">
-                  <c:v>115</c:v>
+                  <c:v>110</c:v>
                 </c:pt>
                 <c:pt idx="3">
-                  <c:v>77</c:v>
+                  <c:v>74</c:v>
                 </c:pt>
                 <c:pt idx="4">
-                  <c:v>38</c:v>
+                  <c:v>37</c:v>
+                </c:pt>
+                <c:pt idx="5">
+                  <c:v>0</c:v>
                 </c:pt>
               </c:numCache>
             </c:numRef>
@@ -6395,7 +6407,7 @@
           <p:nvPr>
             <p:extLst>
               <p:ext uri="{D42A27DB-BD31-4B8C-83A1-F6EECF244321}">
-                <p14:modId xmlns:p14="http://schemas.microsoft.com/office/powerpoint/2010/main" val="2837851086"/>
+                <p14:modId xmlns:p14="http://schemas.microsoft.com/office/powerpoint/2010/main" val="690662882"/>
               </p:ext>
             </p:extLst>
           </p:nvPr>

</xml_diff>